<commit_message>
adding placeholder for the constellation refactoring exercise in case it gets done
</commit_message>
<xml_diff>
--- a/ClassMaterials/CohesionAndCoupling/Slides/Part3-OOD-DP4-NoMsgChains.pptx
+++ b/ClassMaterials/CohesionAndCoupling/Slides/Part3-OOD-DP4-NoMsgChains.pptx
@@ -5,7 +5,7 @@
     <p:sldMasterId id="2147483648" r:id="rId4"/>
   </p:sldMasterIdLst>
   <p:notesMasterIdLst>
-    <p:notesMasterId r:id="rId18"/>
+    <p:notesMasterId r:id="rId19"/>
   </p:notesMasterIdLst>
   <p:sldIdLst>
     <p:sldId id="284" r:id="rId5"/>
@@ -21,6 +21,7 @@
     <p:sldId id="369" r:id="rId15"/>
     <p:sldId id="324" r:id="rId16"/>
     <p:sldId id="383" r:id="rId17"/>
+    <p:sldId id="384" r:id="rId18"/>
   </p:sldIdLst>
   <p:sldSz cx="9144000" cy="6858000" type="screen4x3"/>
   <p:notesSz cx="6858000" cy="9144000"/>
@@ -141,19 +142,83 @@
 <file path=ppt/revisionInfo.xml><?xml version="1.0" encoding="utf-8"?>
 <p1510:revInfo xmlns:a="http://schemas.openxmlformats.org/drawingml/2006/main" xmlns:r="http://schemas.openxmlformats.org/officeDocument/2006/relationships" xmlns:p1510="http://schemas.microsoft.com/office/powerpoint/2015/10/main">
   <p1510:revLst>
-    <p1510:client id="{2764394B-B832-4501-9EC7-FB415C6A4888}" v="1" dt="2021-09-21T14:23:23.922"/>
-    <p1510:client id="{27926F14-478E-40FE-A773-CA0785329433}" v="3" dt="2021-12-27T21:36:27.250"/>
-    <p1510:client id="{37BA3A65-F193-46AF-9069-75364F143632}" v="2" dt="2021-09-21T13:25:01.779"/>
-    <p1510:client id="{6AB22EBC-706A-9B5C-251F-7AB530541375}" v="5" dt="2022-01-26T03:33:09.684"/>
-    <p1510:client id="{8654B735-54CF-66FA-818C-E0869D2407DC}" v="2" dt="2021-09-21T13:29:50.770"/>
-    <p1510:client id="{A1496493-C317-415C-9D63-00543ED5B243}" v="2" dt="2021-09-21T15:32:39.625"/>
-    <p1510:client id="{A48DD35D-0164-428A-BF42-B1ADBF4F738D}" v="3" dt="2021-12-19T23:10:40.080"/>
+    <p1510:client id="{1807BAAE-6515-4351-AAF6-0FA4D3E13E7C}" v="5" dt="2023-11-21T17:50:15.799"/>
   </p1510:revLst>
 </p1510:revInfo>
 </file>
 
 <file path=ppt/changesInfos/changesInfo1.xml><?xml version="1.0" encoding="utf-8"?>
 <pc:chgInfo xmlns:a="http://schemas.openxmlformats.org/drawingml/2006/main" xmlns:r="http://schemas.openxmlformats.org/officeDocument/2006/relationships" xmlns:ac="http://schemas.microsoft.com/office/drawing/2013/main/command" xmlns:pc="http://schemas.microsoft.com/office/powerpoint/2013/main/command">
+  <pc:docChgLst>
+    <pc:chgData name="Toftner, Bennett" userId="S::toftnebj@rose-hulman.edu::5a3b30f9-8c6d-4fad-8617-26fa812dced8" providerId="AD" clId="Web-{A1496493-C317-415C-9D63-00543ED5B243}"/>
+    <pc:docChg chg="sldOrd">
+      <pc:chgData name="Toftner, Bennett" userId="S::toftnebj@rose-hulman.edu::5a3b30f9-8c6d-4fad-8617-26fa812dced8" providerId="AD" clId="Web-{A1496493-C317-415C-9D63-00543ED5B243}" dt="2021-09-21T15:32:39.625" v="1"/>
+      <pc:docMkLst>
+        <pc:docMk/>
+      </pc:docMkLst>
+      <pc:sldChg chg="ord">
+        <pc:chgData name="Toftner, Bennett" userId="S::toftnebj@rose-hulman.edu::5a3b30f9-8c6d-4fad-8617-26fa812dced8" providerId="AD" clId="Web-{A1496493-C317-415C-9D63-00543ED5B243}" dt="2021-09-21T15:32:39.625" v="1"/>
+        <pc:sldMkLst>
+          <pc:docMk/>
+          <pc:sldMk cId="1762503582" sldId="323"/>
+        </pc:sldMkLst>
+      </pc:sldChg>
+      <pc:sldChg chg="ord">
+        <pc:chgData name="Toftner, Bennett" userId="S::toftnebj@rose-hulman.edu::5a3b30f9-8c6d-4fad-8617-26fa812dced8" providerId="AD" clId="Web-{A1496493-C317-415C-9D63-00543ED5B243}" dt="2021-09-21T15:32:33.202" v="0"/>
+        <pc:sldMkLst>
+          <pc:docMk/>
+          <pc:sldMk cId="3730371703" sldId="324"/>
+        </pc:sldMkLst>
+      </pc:sldChg>
+    </pc:docChg>
+  </pc:docChgLst>
+  <pc:docChgLst>
+    <pc:chgData name="Carlson, Nicholas" userId="S::carlsond@rose-hulman.edu::51acec8e-5f25-4389-9c55-1ea51242bb70" providerId="AD" clId="Web-{A48DD35D-0164-428A-BF42-B1ADBF4F738D}"/>
+    <pc:docChg chg="sldOrd">
+      <pc:chgData name="Carlson, Nicholas" userId="S::carlsond@rose-hulman.edu::51acec8e-5f25-4389-9c55-1ea51242bb70" providerId="AD" clId="Web-{A48DD35D-0164-428A-BF42-B1ADBF4F738D}" dt="2021-12-19T23:10:40.080" v="2"/>
+      <pc:docMkLst>
+        <pc:docMk/>
+      </pc:docMkLst>
+      <pc:sldChg chg="ord">
+        <pc:chgData name="Carlson, Nicholas" userId="S::carlsond@rose-hulman.edu::51acec8e-5f25-4389-9c55-1ea51242bb70" providerId="AD" clId="Web-{A48DD35D-0164-428A-BF42-B1ADBF4F738D}" dt="2021-12-19T23:10:40.080" v="2"/>
+        <pc:sldMkLst>
+          <pc:docMk/>
+          <pc:sldMk cId="1762503582" sldId="323"/>
+        </pc:sldMkLst>
+      </pc:sldChg>
+      <pc:sldChg chg="ord">
+        <pc:chgData name="Carlson, Nicholas" userId="S::carlsond@rose-hulman.edu::51acec8e-5f25-4389-9c55-1ea51242bb70" providerId="AD" clId="Web-{A48DD35D-0164-428A-BF42-B1ADBF4F738D}" dt="2021-12-19T23:09:43.987" v="0"/>
+        <pc:sldMkLst>
+          <pc:docMk/>
+          <pc:sldMk cId="3730371703" sldId="324"/>
+        </pc:sldMkLst>
+      </pc:sldChg>
+    </pc:docChg>
+  </pc:docChgLst>
+  <pc:docChgLst>
+    <pc:chgData name="Johnson, Blake" userId="S::johnsobd@rose-hulman.edu::a7d6ae62-5854-480c-9a8c-fb8adceffe2d" providerId="AD" clId="Web-{37BA3A65-F193-46AF-9069-75364F143632}"/>
+    <pc:docChg chg="modSld">
+      <pc:chgData name="Johnson, Blake" userId="S::johnsobd@rose-hulman.edu::a7d6ae62-5854-480c-9a8c-fb8adceffe2d" providerId="AD" clId="Web-{37BA3A65-F193-46AF-9069-75364F143632}" dt="2021-09-21T13:25:01.779" v="1" actId="1076"/>
+      <pc:docMkLst>
+        <pc:docMk/>
+      </pc:docMkLst>
+      <pc:sldChg chg="modSp">
+        <pc:chgData name="Johnson, Blake" userId="S::johnsobd@rose-hulman.edu::a7d6ae62-5854-480c-9a8c-fb8adceffe2d" providerId="AD" clId="Web-{37BA3A65-F193-46AF-9069-75364F143632}" dt="2021-09-21T13:25:01.779" v="1" actId="1076"/>
+        <pc:sldMkLst>
+          <pc:docMk/>
+          <pc:sldMk cId="2020600533" sldId="322"/>
+        </pc:sldMkLst>
+        <pc:spChg chg="mod">
+          <ac:chgData name="Johnson, Blake" userId="S::johnsobd@rose-hulman.edu::a7d6ae62-5854-480c-9a8c-fb8adceffe2d" providerId="AD" clId="Web-{37BA3A65-F193-46AF-9069-75364F143632}" dt="2021-09-21T13:25:01.779" v="1" actId="1076"/>
+          <ac:spMkLst>
+            <pc:docMk/>
+            <pc:sldMk cId="2020600533" sldId="322"/>
+            <ac:spMk id="4" creationId="{00000000-0000-0000-0000-000000000000}"/>
+          </ac:spMkLst>
+        </pc:spChg>
+      </pc:sldChg>
+    </pc:docChg>
+  </pc:docChgLst>
   <pc:docChgLst>
     <pc:chgData name="Tebbe, Jacob" userId="S::tebbejd@rose-hulman.edu::935d442a-f1f0-490b-8cd1-9b3471c18dee" providerId="AD" clId="Web-{2764394B-B832-4501-9EC7-FB415C6A4888}"/>
     <pc:docChg chg="modSld">
@@ -179,26 +244,66 @@
     </pc:docChg>
   </pc:docChgLst>
   <pc:docChgLst>
-    <pc:chgData name="Johnson, Blake" userId="S::johnsobd@rose-hulman.edu::a7d6ae62-5854-480c-9a8c-fb8adceffe2d" providerId="AD" clId="Web-{37BA3A65-F193-46AF-9069-75364F143632}"/>
+    <pc:chgData name="Yoder, Jason" userId="28f4d4d8-da04-4f86-b14d-a21675737bc5" providerId="ADAL" clId="{1807BAAE-6515-4351-AAF6-0FA4D3E13E7C}"/>
+    <pc:docChg chg="addSld modSld">
+      <pc:chgData name="Yoder, Jason" userId="28f4d4d8-da04-4f86-b14d-a21675737bc5" providerId="ADAL" clId="{1807BAAE-6515-4351-AAF6-0FA4D3E13E7C}" dt="2023-11-21T17:50:25.434" v="351" actId="20577"/>
+      <pc:docMkLst>
+        <pc:docMk/>
+      </pc:docMkLst>
+      <pc:sldChg chg="addSp modSp new mod modShow modNotesTx">
+        <pc:chgData name="Yoder, Jason" userId="28f4d4d8-da04-4f86-b14d-a21675737bc5" providerId="ADAL" clId="{1807BAAE-6515-4351-AAF6-0FA4D3E13E7C}" dt="2023-11-21T17:50:25.434" v="351" actId="20577"/>
+        <pc:sldMkLst>
+          <pc:docMk/>
+          <pc:sldMk cId="2830227349" sldId="384"/>
+        </pc:sldMkLst>
+        <pc:spChg chg="mod">
+          <ac:chgData name="Yoder, Jason" userId="28f4d4d8-da04-4f86-b14d-a21675737bc5" providerId="ADAL" clId="{1807BAAE-6515-4351-AAF6-0FA4D3E13E7C}" dt="2023-11-21T17:48:30.291" v="16" actId="20577"/>
+          <ac:spMkLst>
+            <pc:docMk/>
+            <pc:sldMk cId="2830227349" sldId="384"/>
+            <ac:spMk id="2" creationId="{23B75C5D-77B9-3E6E-8826-BA7FA9513CE5}"/>
+          </ac:spMkLst>
+        </pc:spChg>
+        <pc:spChg chg="mod">
+          <ac:chgData name="Yoder, Jason" userId="28f4d4d8-da04-4f86-b14d-a21675737bc5" providerId="ADAL" clId="{1807BAAE-6515-4351-AAF6-0FA4D3E13E7C}" dt="2023-11-21T17:49:53.657" v="285" actId="20577"/>
+          <ac:spMkLst>
+            <pc:docMk/>
+            <pc:sldMk cId="2830227349" sldId="384"/>
+            <ac:spMk id="3" creationId="{4B51939C-E15D-D7C8-D568-CC0AA44FEAAF}"/>
+          </ac:spMkLst>
+        </pc:spChg>
+        <pc:picChg chg="add mod">
+          <ac:chgData name="Yoder, Jason" userId="28f4d4d8-da04-4f86-b14d-a21675737bc5" providerId="ADAL" clId="{1807BAAE-6515-4351-AAF6-0FA4D3E13E7C}" dt="2023-11-21T17:50:15.798" v="290" actId="1076"/>
+          <ac:picMkLst>
+            <pc:docMk/>
+            <pc:sldMk cId="2830227349" sldId="384"/>
+            <ac:picMk id="4" creationId="{EEC3F0CE-8468-8EAD-EAEF-CB0B06A9C615}"/>
+          </ac:picMkLst>
+        </pc:picChg>
+      </pc:sldChg>
+    </pc:docChg>
+  </pc:docChgLst>
+  <pc:docChgLst>
+    <pc:chgData name="Zhang, Frank" userId="S::zhangn2@rose-hulman.edu::8e30b5d1-c229-4107-8340-00a21acb7098" providerId="AD" clId="Web-{6AB22EBC-706A-9B5C-251F-7AB530541375}"/>
     <pc:docChg chg="modSld">
-      <pc:chgData name="Johnson, Blake" userId="S::johnsobd@rose-hulman.edu::a7d6ae62-5854-480c-9a8c-fb8adceffe2d" providerId="AD" clId="Web-{37BA3A65-F193-46AF-9069-75364F143632}" dt="2021-09-21T13:25:01.779" v="1" actId="1076"/>
+      <pc:chgData name="Zhang, Frank" userId="S::zhangn2@rose-hulman.edu::8e30b5d1-c229-4107-8340-00a21acb7098" providerId="AD" clId="Web-{6AB22EBC-706A-9B5C-251F-7AB530541375}" dt="2022-01-26T03:33:09.684" v="4" actId="1076"/>
       <pc:docMkLst>
         <pc:docMk/>
       </pc:docMkLst>
       <pc:sldChg chg="modSp">
-        <pc:chgData name="Johnson, Blake" userId="S::johnsobd@rose-hulman.edu::a7d6ae62-5854-480c-9a8c-fb8adceffe2d" providerId="AD" clId="Web-{37BA3A65-F193-46AF-9069-75364F143632}" dt="2021-09-21T13:25:01.779" v="1" actId="1076"/>
+        <pc:chgData name="Zhang, Frank" userId="S::zhangn2@rose-hulman.edu::8e30b5d1-c229-4107-8340-00a21acb7098" providerId="AD" clId="Web-{6AB22EBC-706A-9B5C-251F-7AB530541375}" dt="2022-01-26T03:33:09.684" v="4" actId="1076"/>
         <pc:sldMkLst>
           <pc:docMk/>
-          <pc:sldMk cId="2020600533" sldId="322"/>
+          <pc:sldMk cId="3730371703" sldId="324"/>
         </pc:sldMkLst>
-        <pc:spChg chg="mod">
-          <ac:chgData name="Johnson, Blake" userId="S::johnsobd@rose-hulman.edu::a7d6ae62-5854-480c-9a8c-fb8adceffe2d" providerId="AD" clId="Web-{37BA3A65-F193-46AF-9069-75364F143632}" dt="2021-09-21T13:25:01.779" v="1" actId="1076"/>
-          <ac:spMkLst>
+        <pc:picChg chg="mod">
+          <ac:chgData name="Zhang, Frank" userId="S::zhangn2@rose-hulman.edu::8e30b5d1-c229-4107-8340-00a21acb7098" providerId="AD" clId="Web-{6AB22EBC-706A-9B5C-251F-7AB530541375}" dt="2022-01-26T03:33:09.684" v="4" actId="1076"/>
+          <ac:picMkLst>
             <pc:docMk/>
-            <pc:sldMk cId="2020600533" sldId="322"/>
-            <ac:spMk id="4" creationId="{00000000-0000-0000-0000-000000000000}"/>
-          </ac:spMkLst>
-        </pc:spChg>
+            <pc:sldMk cId="3730371703" sldId="324"/>
+            <ac:picMk id="10242" creationId="{00000000-0000-0000-0000-000000000000}"/>
+          </ac:picMkLst>
+        </pc:picChg>
       </pc:sldChg>
     </pc:docChg>
   </pc:docChgLst>
@@ -250,76 +355,6 @@
       </pc:sldChg>
     </pc:docChg>
   </pc:docChgLst>
-  <pc:docChgLst>
-    <pc:chgData name="Carlson, Nicholas" userId="S::carlsond@rose-hulman.edu::51acec8e-5f25-4389-9c55-1ea51242bb70" providerId="AD" clId="Web-{A48DD35D-0164-428A-BF42-B1ADBF4F738D}"/>
-    <pc:docChg chg="sldOrd">
-      <pc:chgData name="Carlson, Nicholas" userId="S::carlsond@rose-hulman.edu::51acec8e-5f25-4389-9c55-1ea51242bb70" providerId="AD" clId="Web-{A48DD35D-0164-428A-BF42-B1ADBF4F738D}" dt="2021-12-19T23:10:40.080" v="2"/>
-      <pc:docMkLst>
-        <pc:docMk/>
-      </pc:docMkLst>
-      <pc:sldChg chg="ord">
-        <pc:chgData name="Carlson, Nicholas" userId="S::carlsond@rose-hulman.edu::51acec8e-5f25-4389-9c55-1ea51242bb70" providerId="AD" clId="Web-{A48DD35D-0164-428A-BF42-B1ADBF4F738D}" dt="2021-12-19T23:10:40.080" v="2"/>
-        <pc:sldMkLst>
-          <pc:docMk/>
-          <pc:sldMk cId="1762503582" sldId="323"/>
-        </pc:sldMkLst>
-      </pc:sldChg>
-      <pc:sldChg chg="ord">
-        <pc:chgData name="Carlson, Nicholas" userId="S::carlsond@rose-hulman.edu::51acec8e-5f25-4389-9c55-1ea51242bb70" providerId="AD" clId="Web-{A48DD35D-0164-428A-BF42-B1ADBF4F738D}" dt="2021-12-19T23:09:43.987" v="0"/>
-        <pc:sldMkLst>
-          <pc:docMk/>
-          <pc:sldMk cId="3730371703" sldId="324"/>
-        </pc:sldMkLst>
-      </pc:sldChg>
-    </pc:docChg>
-  </pc:docChgLst>
-  <pc:docChgLst>
-    <pc:chgData name="Toftner, Bennett" userId="S::toftnebj@rose-hulman.edu::5a3b30f9-8c6d-4fad-8617-26fa812dced8" providerId="AD" clId="Web-{A1496493-C317-415C-9D63-00543ED5B243}"/>
-    <pc:docChg chg="sldOrd">
-      <pc:chgData name="Toftner, Bennett" userId="S::toftnebj@rose-hulman.edu::5a3b30f9-8c6d-4fad-8617-26fa812dced8" providerId="AD" clId="Web-{A1496493-C317-415C-9D63-00543ED5B243}" dt="2021-09-21T15:32:39.625" v="1"/>
-      <pc:docMkLst>
-        <pc:docMk/>
-      </pc:docMkLst>
-      <pc:sldChg chg="ord">
-        <pc:chgData name="Toftner, Bennett" userId="S::toftnebj@rose-hulman.edu::5a3b30f9-8c6d-4fad-8617-26fa812dced8" providerId="AD" clId="Web-{A1496493-C317-415C-9D63-00543ED5B243}" dt="2021-09-21T15:32:39.625" v="1"/>
-        <pc:sldMkLst>
-          <pc:docMk/>
-          <pc:sldMk cId="1762503582" sldId="323"/>
-        </pc:sldMkLst>
-      </pc:sldChg>
-      <pc:sldChg chg="ord">
-        <pc:chgData name="Toftner, Bennett" userId="S::toftnebj@rose-hulman.edu::5a3b30f9-8c6d-4fad-8617-26fa812dced8" providerId="AD" clId="Web-{A1496493-C317-415C-9D63-00543ED5B243}" dt="2021-09-21T15:32:33.202" v="0"/>
-        <pc:sldMkLst>
-          <pc:docMk/>
-          <pc:sldMk cId="3730371703" sldId="324"/>
-        </pc:sldMkLst>
-      </pc:sldChg>
-    </pc:docChg>
-  </pc:docChgLst>
-  <pc:docChgLst>
-    <pc:chgData name="Zhang, Frank" userId="S::zhangn2@rose-hulman.edu::8e30b5d1-c229-4107-8340-00a21acb7098" providerId="AD" clId="Web-{6AB22EBC-706A-9B5C-251F-7AB530541375}"/>
-    <pc:docChg chg="modSld">
-      <pc:chgData name="Zhang, Frank" userId="S::zhangn2@rose-hulman.edu::8e30b5d1-c229-4107-8340-00a21acb7098" providerId="AD" clId="Web-{6AB22EBC-706A-9B5C-251F-7AB530541375}" dt="2022-01-26T03:33:09.684" v="4" actId="1076"/>
-      <pc:docMkLst>
-        <pc:docMk/>
-      </pc:docMkLst>
-      <pc:sldChg chg="modSp">
-        <pc:chgData name="Zhang, Frank" userId="S::zhangn2@rose-hulman.edu::8e30b5d1-c229-4107-8340-00a21acb7098" providerId="AD" clId="Web-{6AB22EBC-706A-9B5C-251F-7AB530541375}" dt="2022-01-26T03:33:09.684" v="4" actId="1076"/>
-        <pc:sldMkLst>
-          <pc:docMk/>
-          <pc:sldMk cId="3730371703" sldId="324"/>
-        </pc:sldMkLst>
-        <pc:picChg chg="mod">
-          <ac:chgData name="Zhang, Frank" userId="S::zhangn2@rose-hulman.edu::8e30b5d1-c229-4107-8340-00a21acb7098" providerId="AD" clId="Web-{6AB22EBC-706A-9B5C-251F-7AB530541375}" dt="2022-01-26T03:33:09.684" v="4" actId="1076"/>
-          <ac:picMkLst>
-            <pc:docMk/>
-            <pc:sldMk cId="3730371703" sldId="324"/>
-            <ac:picMk id="10242" creationId="{00000000-0000-0000-0000-000000000000}"/>
-          </ac:picMkLst>
-        </pc:picChg>
-      </pc:sldChg>
-    </pc:docChg>
-  </pc:docChgLst>
 </pc:chgInfo>
 </file>
 
@@ -405,7 +440,7 @@
           <a:p>
             <a:fld id="{11374350-B736-4AC1-A1E7-19777DF1B0E1}" type="datetimeFigureOut">
               <a:rPr lang="en-US" smtClean="0"/>
-              <a:t>11/22/2022</a:t>
+              <a:t>11/21/2023</a:t>
             </a:fld>
             <a:endParaRPr lang="en-US"/>
           </a:p>
@@ -889,6 +924,93 @@
 </p:notes>
 </file>
 
+<file path=ppt/notesSlides/notesSlide11.xml><?xml version="1.0" encoding="utf-8"?>
+<p:notes xmlns:a="http://schemas.openxmlformats.org/drawingml/2006/main" xmlns:r="http://schemas.openxmlformats.org/officeDocument/2006/relationships" xmlns:p="http://schemas.openxmlformats.org/presentationml/2006/main">
+  <p:cSld>
+    <p:spTree>
+      <p:nvGrpSpPr>
+        <p:cNvPr id="1" name=""/>
+        <p:cNvGrpSpPr/>
+        <p:nvPr/>
+      </p:nvGrpSpPr>
+      <p:grpSpPr>
+        <a:xfrm>
+          <a:off x="0" y="0"/>
+          <a:ext cx="0" cy="0"/>
+          <a:chOff x="0" y="0"/>
+          <a:chExt cx="0" cy="0"/>
+        </a:xfrm>
+      </p:grpSpPr>
+      <p:sp>
+        <p:nvSpPr>
+          <p:cNvPr id="2" name="Slide Image Placeholder 1"/>
+          <p:cNvSpPr>
+            <a:spLocks noGrp="1" noRot="1" noChangeAspect="1"/>
+          </p:cNvSpPr>
+          <p:nvPr>
+            <p:ph type="sldImg"/>
+          </p:nvPr>
+        </p:nvSpPr>
+        <p:spPr/>
+      </p:sp>
+      <p:sp>
+        <p:nvSpPr>
+          <p:cNvPr id="3" name="Notes Placeholder 2"/>
+          <p:cNvSpPr>
+            <a:spLocks noGrp="1"/>
+          </p:cNvSpPr>
+          <p:nvPr>
+            <p:ph type="body" idx="1"/>
+          </p:nvPr>
+        </p:nvSpPr>
+        <p:spPr/>
+        <p:txBody>
+          <a:bodyPr/>
+          <a:lstStyle/>
+          <a:p>
+            <a:r>
+              <a:rPr lang="en-US" dirty="0"/>
+              <a:t>Note: this might or might not be ready for Winter 2023-24</a:t>
+            </a:r>
+          </a:p>
+        </p:txBody>
+      </p:sp>
+      <p:sp>
+        <p:nvSpPr>
+          <p:cNvPr id="4" name="Slide Number Placeholder 3"/>
+          <p:cNvSpPr>
+            <a:spLocks noGrp="1"/>
+          </p:cNvSpPr>
+          <p:nvPr>
+            <p:ph type="sldNum" sz="quarter" idx="5"/>
+          </p:nvPr>
+        </p:nvSpPr>
+        <p:spPr/>
+        <p:txBody>
+          <a:bodyPr/>
+          <a:lstStyle/>
+          <a:p>
+            <a:fld id="{AC522A93-4968-4B29-BB16-64A778254383}" type="slidenum">
+              <a:rPr lang="en-US" smtClean="0"/>
+              <a:t>14</a:t>
+            </a:fld>
+            <a:endParaRPr lang="en-US"/>
+          </a:p>
+        </p:txBody>
+      </p:sp>
+    </p:spTree>
+    <p:extLst>
+      <p:ext uri="{BB962C8B-B14F-4D97-AF65-F5344CB8AC3E}">
+        <p14:creationId xmlns:p14="http://schemas.microsoft.com/office/powerpoint/2010/main" val="1090067054"/>
+      </p:ext>
+    </p:extLst>
+  </p:cSld>
+  <p:clrMapOvr>
+    <a:masterClrMapping/>
+  </p:clrMapOvr>
+</p:notes>
+</file>
+
 <file path=ppt/notesSlides/notesSlide2.xml><?xml version="1.0" encoding="utf-8"?>
 <p:notes xmlns:a="http://schemas.openxmlformats.org/drawingml/2006/main" xmlns:r="http://schemas.openxmlformats.org/officeDocument/2006/relationships" xmlns:p="http://schemas.openxmlformats.org/presentationml/2006/main">
   <p:cSld>
@@ -2571,7 +2693,7 @@
           <a:p>
             <a:fld id="{50A519B0-864F-436F-AD10-563B5AD2C023}" type="datetimeFigureOut">
               <a:rPr lang="en-US" smtClean="0"/>
-              <a:t>11/22/2022</a:t>
+              <a:t>11/21/2023</a:t>
             </a:fld>
             <a:endParaRPr lang="en-US"/>
           </a:p>
@@ -2739,7 +2861,7 @@
           <a:p>
             <a:fld id="{50A519B0-864F-436F-AD10-563B5AD2C023}" type="datetimeFigureOut">
               <a:rPr lang="en-US" smtClean="0"/>
-              <a:t>11/22/2022</a:t>
+              <a:t>11/21/2023</a:t>
             </a:fld>
             <a:endParaRPr lang="en-US"/>
           </a:p>
@@ -2917,7 +3039,7 @@
           <a:p>
             <a:fld id="{50A519B0-864F-436F-AD10-563B5AD2C023}" type="datetimeFigureOut">
               <a:rPr lang="en-US" smtClean="0"/>
-              <a:t>11/22/2022</a:t>
+              <a:t>11/21/2023</a:t>
             </a:fld>
             <a:endParaRPr lang="en-US"/>
           </a:p>
@@ -3085,7 +3207,7 @@
           <a:p>
             <a:fld id="{50A519B0-864F-436F-AD10-563B5AD2C023}" type="datetimeFigureOut">
               <a:rPr lang="en-US" smtClean="0"/>
-              <a:t>11/22/2022</a:t>
+              <a:t>11/21/2023</a:t>
             </a:fld>
             <a:endParaRPr lang="en-US"/>
           </a:p>
@@ -3330,7 +3452,7 @@
           <a:p>
             <a:fld id="{50A519B0-864F-436F-AD10-563B5AD2C023}" type="datetimeFigureOut">
               <a:rPr lang="en-US" smtClean="0"/>
-              <a:t>11/22/2022</a:t>
+              <a:t>11/21/2023</a:t>
             </a:fld>
             <a:endParaRPr lang="en-US"/>
           </a:p>
@@ -3615,7 +3737,7 @@
           <a:p>
             <a:fld id="{50A519B0-864F-436F-AD10-563B5AD2C023}" type="datetimeFigureOut">
               <a:rPr lang="en-US" smtClean="0"/>
-              <a:t>11/22/2022</a:t>
+              <a:t>11/21/2023</a:t>
             </a:fld>
             <a:endParaRPr lang="en-US"/>
           </a:p>
@@ -4034,7 +4156,7 @@
           <a:p>
             <a:fld id="{50A519B0-864F-436F-AD10-563B5AD2C023}" type="datetimeFigureOut">
               <a:rPr lang="en-US" smtClean="0"/>
-              <a:t>11/22/2022</a:t>
+              <a:t>11/21/2023</a:t>
             </a:fld>
             <a:endParaRPr lang="en-US"/>
           </a:p>
@@ -4151,7 +4273,7 @@
           <a:p>
             <a:fld id="{50A519B0-864F-436F-AD10-563B5AD2C023}" type="datetimeFigureOut">
               <a:rPr lang="en-US" smtClean="0"/>
-              <a:t>11/22/2022</a:t>
+              <a:t>11/21/2023</a:t>
             </a:fld>
             <a:endParaRPr lang="en-US"/>
           </a:p>
@@ -4246,7 +4368,7 @@
           <a:p>
             <a:fld id="{50A519B0-864F-436F-AD10-563B5AD2C023}" type="datetimeFigureOut">
               <a:rPr lang="en-US" smtClean="0"/>
-              <a:t>11/22/2022</a:t>
+              <a:t>11/21/2023</a:t>
             </a:fld>
             <a:endParaRPr lang="en-US"/>
           </a:p>
@@ -4521,7 +4643,7 @@
           <a:p>
             <a:fld id="{50A519B0-864F-436F-AD10-563B5AD2C023}" type="datetimeFigureOut">
               <a:rPr lang="en-US" smtClean="0"/>
-              <a:t>11/22/2022</a:t>
+              <a:t>11/21/2023</a:t>
             </a:fld>
             <a:endParaRPr lang="en-US"/>
           </a:p>
@@ -4773,7 +4895,7 @@
           <a:p>
             <a:fld id="{50A519B0-864F-436F-AD10-563B5AD2C023}" type="datetimeFigureOut">
               <a:rPr lang="en-US" smtClean="0"/>
-              <a:t>11/22/2022</a:t>
+              <a:t>11/21/2023</a:t>
             </a:fld>
             <a:endParaRPr lang="en-US"/>
           </a:p>
@@ -4984,7 +5106,7 @@
           <a:p>
             <a:fld id="{50A519B0-864F-436F-AD10-563B5AD2C023}" type="datetimeFigureOut">
               <a:rPr lang="en-US" smtClean="0"/>
-              <a:t>11/22/2022</a:t>
+              <a:t>11/21/2023</a:t>
             </a:fld>
             <a:endParaRPr lang="en-US"/>
           </a:p>
@@ -6590,6 +6712,152 @@
     <p:extLst>
       <p:ext uri="{BB962C8B-B14F-4D97-AF65-F5344CB8AC3E}">
         <p14:creationId xmlns:p14="http://schemas.microsoft.com/office/powerpoint/2010/main" val="3490565080"/>
+      </p:ext>
+    </p:extLst>
+  </p:cSld>
+  <p:clrMapOvr>
+    <a:masterClrMapping/>
+  </p:clrMapOvr>
+</p:sld>
+</file>
+
+<file path=ppt/slides/slide14.xml><?xml version="1.0" encoding="utf-8"?>
+<p:sld xmlns:a="http://schemas.openxmlformats.org/drawingml/2006/main" xmlns:r="http://schemas.openxmlformats.org/officeDocument/2006/relationships" xmlns:p="http://schemas.openxmlformats.org/presentationml/2006/main" show="0">
+  <p:cSld>
+    <p:spTree>
+      <p:nvGrpSpPr>
+        <p:cNvPr id="1" name=""/>
+        <p:cNvGrpSpPr/>
+        <p:nvPr/>
+      </p:nvGrpSpPr>
+      <p:grpSpPr>
+        <a:xfrm>
+          <a:off x="0" y="0"/>
+          <a:ext cx="0" cy="0"/>
+          <a:chOff x="0" y="0"/>
+          <a:chExt cx="0" cy="0"/>
+        </a:xfrm>
+      </p:grpSpPr>
+      <p:sp>
+        <p:nvSpPr>
+          <p:cNvPr id="2" name="Title 1">
+            <a:extLst>
+              <a:ext uri="{FF2B5EF4-FFF2-40B4-BE49-F238E27FC236}">
+                <a16:creationId xmlns:a16="http://schemas.microsoft.com/office/drawing/2014/main" id="{23B75C5D-77B9-3E6E-8826-BA7FA9513CE5}"/>
+              </a:ext>
+            </a:extLst>
+          </p:cNvPr>
+          <p:cNvSpPr>
+            <a:spLocks noGrp="1"/>
+          </p:cNvSpPr>
+          <p:nvPr>
+            <p:ph type="title"/>
+          </p:nvPr>
+        </p:nvSpPr>
+        <p:spPr/>
+        <p:txBody>
+          <a:bodyPr/>
+          <a:lstStyle/>
+          <a:p>
+            <a:r>
+              <a:rPr lang="en-US" dirty="0"/>
+              <a:t>Coding Exercise</a:t>
+            </a:r>
+          </a:p>
+        </p:txBody>
+      </p:sp>
+      <p:sp>
+        <p:nvSpPr>
+          <p:cNvPr id="3" name="Content Placeholder 2">
+            <a:extLst>
+              <a:ext uri="{FF2B5EF4-FFF2-40B4-BE49-F238E27FC236}">
+                <a16:creationId xmlns:a16="http://schemas.microsoft.com/office/drawing/2014/main" id="{4B51939C-E15D-D7C8-D568-CC0AA44FEAAF}"/>
+              </a:ext>
+            </a:extLst>
+          </p:cNvPr>
+          <p:cNvSpPr>
+            <a:spLocks noGrp="1"/>
+          </p:cNvSpPr>
+          <p:nvPr>
+            <p:ph idx="1"/>
+          </p:nvPr>
+        </p:nvSpPr>
+        <p:spPr/>
+        <p:txBody>
+          <a:bodyPr/>
+          <a:lstStyle/>
+          <a:p>
+            <a:r>
+              <a:rPr lang="en-US" dirty="0"/>
+              <a:t>An implementation of the Constellation Problem can be imported </a:t>
+            </a:r>
+          </a:p>
+          <a:p>
+            <a:r>
+              <a:rPr lang="en-US" dirty="0"/>
+              <a:t>We provide the bad implementation with the message chain</a:t>
+            </a:r>
+          </a:p>
+          <a:p>
+            <a:r>
+              <a:rPr lang="en-US" dirty="0"/>
+              <a:t>We would like you to refactor it to implement this solution</a:t>
+            </a:r>
+          </a:p>
+        </p:txBody>
+      </p:sp>
+      <p:pic>
+        <p:nvPicPr>
+          <p:cNvPr id="4" name="Picture 2" descr="https://lh5.googleusercontent.com/4Zh1obmGMUi5dyIjrssGfxKS0wlNTIhXo1V7RdyBGTC2sVbsow_WmY3nyTDaq_8qkKm2xOaDvUIWh31oesuyL0SCjqdNKHCg2qaQDaPYaaaTvPF5j2LksOO0RmxqTv8UEXUlYHLn">
+            <a:hlinkClick r:id="rId3"/>
+            <a:extLst>
+              <a:ext uri="{FF2B5EF4-FFF2-40B4-BE49-F238E27FC236}">
+                <a16:creationId xmlns:a16="http://schemas.microsoft.com/office/drawing/2014/main" id="{EEC3F0CE-8468-8EAD-EAEF-CB0B06A9C615}"/>
+              </a:ext>
+            </a:extLst>
+          </p:cNvPr>
+          <p:cNvPicPr>
+            <a:picLocks noChangeAspect="1" noChangeArrowheads="1"/>
+          </p:cNvPicPr>
+          <p:nvPr/>
+        </p:nvPicPr>
+        <p:blipFill>
+          <a:blip r:embed="rId4">
+            <a:extLst>
+              <a:ext uri="{28A0092B-C50C-407E-A947-70E740481C1C}">
+                <a14:useLocalDpi xmlns:a14="http://schemas.microsoft.com/office/drawing/2010/main" val="0"/>
+              </a:ext>
+            </a:extLst>
+          </a:blip>
+          <a:srcRect/>
+          <a:stretch>
+            <a:fillRect/>
+          </a:stretch>
+        </p:blipFill>
+        <p:spPr bwMode="auto">
+          <a:xfrm>
+            <a:off x="3256262" y="4498521"/>
+            <a:ext cx="5757110" cy="2334986"/>
+          </a:xfrm>
+          <a:prstGeom prst="rect">
+            <a:avLst/>
+          </a:prstGeom>
+          <a:noFill/>
+          <a:extLst>
+            <a:ext uri="{909E8E84-426E-40DD-AFC4-6F175D3DCCD1}">
+              <a14:hiddenFill xmlns:a14="http://schemas.microsoft.com/office/drawing/2010/main">
+                <a:solidFill>
+                  <a:srgbClr val="FFFFFF"/>
+                </a:solidFill>
+              </a14:hiddenFill>
+            </a:ext>
+          </a:extLst>
+        </p:spPr>
+      </p:pic>
+    </p:spTree>
+    <p:extLst>
+      <p:ext uri="{BB962C8B-B14F-4D97-AF65-F5344CB8AC3E}">
+        <p14:creationId xmlns:p14="http://schemas.microsoft.com/office/powerpoint/2010/main" val="2830227349"/>
       </p:ext>
     </p:extLst>
   </p:cSld>
@@ -9902,12 +10170,9 @@
 </file>
 
 <file path=customXml/item1.xml><?xml version="1.0" encoding="utf-8"?>
-<?mso-contentType ?>
-<FormTemplates xmlns="http://schemas.microsoft.com/sharepoint/v3/contenttype/forms">
-  <Display>DocumentLibraryForm</Display>
-  <Edit>DocumentLibraryForm</Edit>
-  <New>DocumentLibraryForm</New>
-</FormTemplates>
+<p:properties xmlns:p="http://schemas.microsoft.com/office/2006/metadata/properties" xmlns:xsi="http://www.w3.org/2001/XMLSchema-instance" xmlns:pc="http://schemas.microsoft.com/office/infopath/2007/PartnerControls">
+  <documentManagement/>
+</p:properties>
 </file>
 
 <file path=customXml/item2.xml><?xml version="1.0" encoding="utf-8"?>
@@ -10081,15 +10346,19 @@
 </file>
 
 <file path=customXml/item3.xml><?xml version="1.0" encoding="utf-8"?>
-<p:properties xmlns:p="http://schemas.microsoft.com/office/2006/metadata/properties" xmlns:xsi="http://www.w3.org/2001/XMLSchema-instance" xmlns:pc="http://schemas.microsoft.com/office/infopath/2007/PartnerControls">
-  <documentManagement/>
-</p:properties>
+<?mso-contentType ?>
+<FormTemplates xmlns="http://schemas.microsoft.com/sharepoint/v3/contenttype/forms">
+  <Display>DocumentLibraryForm</Display>
+  <Edit>DocumentLibraryForm</Edit>
+  <New>DocumentLibraryForm</New>
+</FormTemplates>
 </file>
 
 <file path=customXml/itemProps1.xml><?xml version="1.0" encoding="utf-8"?>
-<ds:datastoreItem xmlns:ds="http://schemas.openxmlformats.org/officeDocument/2006/customXml" ds:itemID="{7CABB6C1-D9E7-45C6-B683-F944B25B9227}">
+<ds:datastoreItem xmlns:ds="http://schemas.openxmlformats.org/officeDocument/2006/customXml" ds:itemID="{CECD7DFB-CAF9-4BF5-9FF9-8CAEDD46FB72}">
   <ds:schemaRefs>
-    <ds:schemaRef ds:uri="http://schemas.microsoft.com/sharepoint/v3/contenttype/forms"/>
+    <ds:schemaRef ds:uri="http://schemas.microsoft.com/office/2006/metadata/properties"/>
+    <ds:schemaRef ds:uri="http://schemas.microsoft.com/office/infopath/2007/PartnerControls"/>
   </ds:schemaRefs>
 </ds:datastoreItem>
 </file>
@@ -10113,10 +10382,9 @@
 </file>
 
 <file path=customXml/itemProps3.xml><?xml version="1.0" encoding="utf-8"?>
-<ds:datastoreItem xmlns:ds="http://schemas.openxmlformats.org/officeDocument/2006/customXml" ds:itemID="{CECD7DFB-CAF9-4BF5-9FF9-8CAEDD46FB72}">
+<ds:datastoreItem xmlns:ds="http://schemas.openxmlformats.org/officeDocument/2006/customXml" ds:itemID="{7CABB6C1-D9E7-45C6-B683-F944B25B9227}">
   <ds:schemaRefs>
-    <ds:schemaRef ds:uri="http://schemas.microsoft.com/office/2006/metadata/properties"/>
-    <ds:schemaRef ds:uri="http://schemas.microsoft.com/office/infopath/2007/PartnerControls"/>
+    <ds:schemaRef ds:uri="http://schemas.microsoft.com/sharepoint/v3/contenttype/forms"/>
   </ds:schemaRefs>
 </ds:datastoreItem>
 </file>
</xml_diff>